<commit_message>
Added/changed a few things in projects/
</commit_message>
<xml_diff>
--- a/projects/ProjectIntro.pptx
+++ b/projects/ProjectIntro.pptx
@@ -263,7 +263,7 @@
           <a:p>
             <a:fld id="{C77A8B6D-B5EF-A245-ADA4-5772FA5FCFF6}" type="datetimeFigureOut">
               <a:rPr lang="en-DK" smtClean="0"/>
-              <a:t>24/05/2022</a:t>
+              <a:t>25/05/2022</a:t>
             </a:fld>
             <a:endParaRPr lang="en-DK"/>
           </a:p>
@@ -463,7 +463,7 @@
           <a:p>
             <a:fld id="{C77A8B6D-B5EF-A245-ADA4-5772FA5FCFF6}" type="datetimeFigureOut">
               <a:rPr lang="en-DK" smtClean="0"/>
-              <a:t>24/05/2022</a:t>
+              <a:t>25/05/2022</a:t>
             </a:fld>
             <a:endParaRPr lang="en-DK"/>
           </a:p>
@@ -673,7 +673,7 @@
           <a:p>
             <a:fld id="{C77A8B6D-B5EF-A245-ADA4-5772FA5FCFF6}" type="datetimeFigureOut">
               <a:rPr lang="en-DK" smtClean="0"/>
-              <a:t>24/05/2022</a:t>
+              <a:t>25/05/2022</a:t>
             </a:fld>
             <a:endParaRPr lang="en-DK"/>
           </a:p>
@@ -873,7 +873,7 @@
           <a:p>
             <a:fld id="{C77A8B6D-B5EF-A245-ADA4-5772FA5FCFF6}" type="datetimeFigureOut">
               <a:rPr lang="en-DK" smtClean="0"/>
-              <a:t>24/05/2022</a:t>
+              <a:t>25/05/2022</a:t>
             </a:fld>
             <a:endParaRPr lang="en-DK"/>
           </a:p>
@@ -1149,7 +1149,7 @@
           <a:p>
             <a:fld id="{C77A8B6D-B5EF-A245-ADA4-5772FA5FCFF6}" type="datetimeFigureOut">
               <a:rPr lang="en-DK" smtClean="0"/>
-              <a:t>24/05/2022</a:t>
+              <a:t>25/05/2022</a:t>
             </a:fld>
             <a:endParaRPr lang="en-DK"/>
           </a:p>
@@ -1417,7 +1417,7 @@
           <a:p>
             <a:fld id="{C77A8B6D-B5EF-A245-ADA4-5772FA5FCFF6}" type="datetimeFigureOut">
               <a:rPr lang="en-DK" smtClean="0"/>
-              <a:t>24/05/2022</a:t>
+              <a:t>25/05/2022</a:t>
             </a:fld>
             <a:endParaRPr lang="en-DK"/>
           </a:p>
@@ -1832,7 +1832,7 @@
           <a:p>
             <a:fld id="{C77A8B6D-B5EF-A245-ADA4-5772FA5FCFF6}" type="datetimeFigureOut">
               <a:rPr lang="en-DK" smtClean="0"/>
-              <a:t>24/05/2022</a:t>
+              <a:t>25/05/2022</a:t>
             </a:fld>
             <a:endParaRPr lang="en-DK"/>
           </a:p>
@@ -1974,7 +1974,7 @@
           <a:p>
             <a:fld id="{C77A8B6D-B5EF-A245-ADA4-5772FA5FCFF6}" type="datetimeFigureOut">
               <a:rPr lang="en-DK" smtClean="0"/>
-              <a:t>24/05/2022</a:t>
+              <a:t>25/05/2022</a:t>
             </a:fld>
             <a:endParaRPr lang="en-DK"/>
           </a:p>
@@ -2087,7 +2087,7 @@
           <a:p>
             <a:fld id="{C77A8B6D-B5EF-A245-ADA4-5772FA5FCFF6}" type="datetimeFigureOut">
               <a:rPr lang="en-DK" smtClean="0"/>
-              <a:t>24/05/2022</a:t>
+              <a:t>25/05/2022</a:t>
             </a:fld>
             <a:endParaRPr lang="en-DK"/>
           </a:p>
@@ -2400,7 +2400,7 @@
           <a:p>
             <a:fld id="{C77A8B6D-B5EF-A245-ADA4-5772FA5FCFF6}" type="datetimeFigureOut">
               <a:rPr lang="en-DK" smtClean="0"/>
-              <a:t>24/05/2022</a:t>
+              <a:t>25/05/2022</a:t>
             </a:fld>
             <a:endParaRPr lang="en-DK"/>
           </a:p>
@@ -2689,7 +2689,7 @@
           <a:p>
             <a:fld id="{C77A8B6D-B5EF-A245-ADA4-5772FA5FCFF6}" type="datetimeFigureOut">
               <a:rPr lang="en-DK" smtClean="0"/>
-              <a:t>24/05/2022</a:t>
+              <a:t>25/05/2022</a:t>
             </a:fld>
             <a:endParaRPr lang="en-DK"/>
           </a:p>
@@ -2932,7 +2932,7 @@
           <a:p>
             <a:fld id="{C77A8B6D-B5EF-A245-ADA4-5772FA5FCFF6}" type="datetimeFigureOut">
               <a:rPr lang="en-DK" smtClean="0"/>
-              <a:t>24/05/2022</a:t>
+              <a:t>25/05/2022</a:t>
             </a:fld>
             <a:endParaRPr lang="en-DK"/>
           </a:p>
@@ -3511,17 +3511,13 @@
           <a:p>
             <a:r>
               <a:rPr lang="en-DK" sz="2200" dirty="0"/>
-              <a:t>The goal of the project is to come with an small Neural network task</a:t>
+              <a:t>The goal of the project is to do machine learning on some real data</a:t>
             </a:r>
           </a:p>
           <a:p>
             <a:r>
               <a:rPr lang="en-DK" sz="2200" dirty="0"/>
-              <a:t>You can use your own data, but the focus needs to be </a:t>
-            </a:r>
-            <a:r>
-              <a:rPr lang="en-DK" sz="2200"/>
-              <a:t>on pytorch. </a:t>
+              <a:t>You can use your own data, but the focus needs to be on pytorch. </a:t>
             </a:r>
             <a:r>
               <a:rPr lang="en-DK" sz="2200" b="1" dirty="0"/>
@@ -3531,80 +3527,13 @@
           <a:p>
             <a:r>
               <a:rPr lang="en-DK" sz="2200" dirty="0"/>
-              <a:t>Proposed datasets</a:t>
-            </a:r>
-          </a:p>
-          <a:p>
-            <a:pPr lvl="1"/>
-            <a:r>
-              <a:rPr lang="en-DK" sz="1800" dirty="0"/>
-              <a:t>Gene expression data (“</a:t>
-            </a:r>
-            <a:r>
-              <a:rPr lang="en-GB" sz="1800" dirty="0" err="1"/>
-              <a:t>IntroToML</a:t>
-            </a:r>
-            <a:r>
-              <a:rPr lang="en-GB" sz="1800" dirty="0"/>
-              <a:t>/data/</a:t>
-            </a:r>
-            <a:r>
-              <a:rPr lang="en-GB" sz="1800" dirty="0" err="1"/>
-              <a:t>gtex_with_cancer.csv.gz</a:t>
-            </a:r>
-            <a:r>
-              <a:rPr lang="en-GB" sz="1800" dirty="0"/>
-              <a:t>”</a:t>
-            </a:r>
-            <a:r>
-              <a:rPr lang="en-DK" sz="1800" dirty="0"/>
-              <a:t>)</a:t>
-            </a:r>
-          </a:p>
-          <a:p>
-            <a:pPr lvl="1"/>
-            <a:r>
-              <a:rPr lang="en-DK" sz="1800" dirty="0"/>
-              <a:t>Metagenomic kmers (“</a:t>
-            </a:r>
-            <a:r>
-              <a:rPr lang="en-GB" sz="1800" dirty="0" err="1"/>
-              <a:t>IntroToML</a:t>
-            </a:r>
-            <a:r>
-              <a:rPr lang="en-GB" sz="1800" dirty="0"/>
-              <a:t>/data/</a:t>
-            </a:r>
-            <a:r>
-              <a:rPr lang="en-GB" sz="1800" dirty="0" err="1"/>
-              <a:t>kmers</a:t>
-            </a:r>
-            <a:r>
-              <a:rPr lang="en-GB" sz="1800" dirty="0"/>
-              <a:t>*</a:t>
-            </a:r>
-            <a:r>
-              <a:rPr lang="en-DK" sz="1800" dirty="0"/>
-              <a:t>”). You have some project hints under (“</a:t>
-            </a:r>
-            <a:r>
-              <a:rPr lang="en-GB" sz="1800" dirty="0" err="1"/>
-              <a:t>IntroToML</a:t>
-            </a:r>
-            <a:r>
-              <a:rPr lang="en-GB" sz="1800" dirty="0"/>
-              <a:t>/projects/</a:t>
-            </a:r>
-            <a:r>
-              <a:rPr lang="en-GB" sz="1800" dirty="0" err="1"/>
-              <a:t>kmers.md</a:t>
-            </a:r>
-            <a:r>
-              <a:rPr lang="en-DK" sz="1800" dirty="0"/>
-              <a:t>”)</a:t>
-            </a:r>
-          </a:p>
-          <a:p>
+              <a:t>Proposed datasets can be found in projects folder in Github</a:t>
+            </a:r>
+          </a:p>
+          <a:p>
+            <a:pPr marL="0" indent="0">
+              <a:buNone/>
+            </a:pPr>
             <a:endParaRPr lang="en-DK" sz="2200" dirty="0"/>
           </a:p>
         </p:txBody>

</xml_diff>

<commit_message>
updated slides of projects
</commit_message>
<xml_diff>
--- a/projects/ProjectIntro.pptx
+++ b/projects/ProjectIntro.pptx
@@ -263,7 +263,7 @@
           <a:p>
             <a:fld id="{C77A8B6D-B5EF-A245-ADA4-5772FA5FCFF6}" type="datetimeFigureOut">
               <a:rPr lang="en-DK" smtClean="0"/>
-              <a:t>25/05/2022</a:t>
+              <a:t>25/04/2023</a:t>
             </a:fld>
             <a:endParaRPr lang="en-DK"/>
           </a:p>
@@ -463,7 +463,7 @@
           <a:p>
             <a:fld id="{C77A8B6D-B5EF-A245-ADA4-5772FA5FCFF6}" type="datetimeFigureOut">
               <a:rPr lang="en-DK" smtClean="0"/>
-              <a:t>25/05/2022</a:t>
+              <a:t>25/04/2023</a:t>
             </a:fld>
             <a:endParaRPr lang="en-DK"/>
           </a:p>
@@ -673,7 +673,7 @@
           <a:p>
             <a:fld id="{C77A8B6D-B5EF-A245-ADA4-5772FA5FCFF6}" type="datetimeFigureOut">
               <a:rPr lang="en-DK" smtClean="0"/>
-              <a:t>25/05/2022</a:t>
+              <a:t>25/04/2023</a:t>
             </a:fld>
             <a:endParaRPr lang="en-DK"/>
           </a:p>
@@ -873,7 +873,7 @@
           <a:p>
             <a:fld id="{C77A8B6D-B5EF-A245-ADA4-5772FA5FCFF6}" type="datetimeFigureOut">
               <a:rPr lang="en-DK" smtClean="0"/>
-              <a:t>25/05/2022</a:t>
+              <a:t>25/04/2023</a:t>
             </a:fld>
             <a:endParaRPr lang="en-DK"/>
           </a:p>
@@ -1149,7 +1149,7 @@
           <a:p>
             <a:fld id="{C77A8B6D-B5EF-A245-ADA4-5772FA5FCFF6}" type="datetimeFigureOut">
               <a:rPr lang="en-DK" smtClean="0"/>
-              <a:t>25/05/2022</a:t>
+              <a:t>25/04/2023</a:t>
             </a:fld>
             <a:endParaRPr lang="en-DK"/>
           </a:p>
@@ -1417,7 +1417,7 @@
           <a:p>
             <a:fld id="{C77A8B6D-B5EF-A245-ADA4-5772FA5FCFF6}" type="datetimeFigureOut">
               <a:rPr lang="en-DK" smtClean="0"/>
-              <a:t>25/05/2022</a:t>
+              <a:t>25/04/2023</a:t>
             </a:fld>
             <a:endParaRPr lang="en-DK"/>
           </a:p>
@@ -1832,7 +1832,7 @@
           <a:p>
             <a:fld id="{C77A8B6D-B5EF-A245-ADA4-5772FA5FCFF6}" type="datetimeFigureOut">
               <a:rPr lang="en-DK" smtClean="0"/>
-              <a:t>25/05/2022</a:t>
+              <a:t>25/04/2023</a:t>
             </a:fld>
             <a:endParaRPr lang="en-DK"/>
           </a:p>
@@ -1974,7 +1974,7 @@
           <a:p>
             <a:fld id="{C77A8B6D-B5EF-A245-ADA4-5772FA5FCFF6}" type="datetimeFigureOut">
               <a:rPr lang="en-DK" smtClean="0"/>
-              <a:t>25/05/2022</a:t>
+              <a:t>25/04/2023</a:t>
             </a:fld>
             <a:endParaRPr lang="en-DK"/>
           </a:p>
@@ -2087,7 +2087,7 @@
           <a:p>
             <a:fld id="{C77A8B6D-B5EF-A245-ADA4-5772FA5FCFF6}" type="datetimeFigureOut">
               <a:rPr lang="en-DK" smtClean="0"/>
-              <a:t>25/05/2022</a:t>
+              <a:t>25/04/2023</a:t>
             </a:fld>
             <a:endParaRPr lang="en-DK"/>
           </a:p>
@@ -2400,7 +2400,7 @@
           <a:p>
             <a:fld id="{C77A8B6D-B5EF-A245-ADA4-5772FA5FCFF6}" type="datetimeFigureOut">
               <a:rPr lang="en-DK" smtClean="0"/>
-              <a:t>25/05/2022</a:t>
+              <a:t>25/04/2023</a:t>
             </a:fld>
             <a:endParaRPr lang="en-DK"/>
           </a:p>
@@ -2689,7 +2689,7 @@
           <a:p>
             <a:fld id="{C77A8B6D-B5EF-A245-ADA4-5772FA5FCFF6}" type="datetimeFigureOut">
               <a:rPr lang="en-DK" smtClean="0"/>
-              <a:t>25/05/2022</a:t>
+              <a:t>25/04/2023</a:t>
             </a:fld>
             <a:endParaRPr lang="en-DK"/>
           </a:p>
@@ -2932,7 +2932,7 @@
           <a:p>
             <a:fld id="{C77A8B6D-B5EF-A245-ADA4-5772FA5FCFF6}" type="datetimeFigureOut">
               <a:rPr lang="en-DK" smtClean="0"/>
-              <a:t>25/05/2022</a:t>
+              <a:t>25/04/2023</a:t>
             </a:fld>
             <a:endParaRPr lang="en-DK"/>
           </a:p>
@@ -3405,12 +3405,6 @@
           <a:p>
             <a:r>
               <a:rPr lang="en-DK" dirty="0"/>
-              <a:t>Anders Krogh </a:t>
-            </a:r>
-          </a:p>
-          <a:p>
-            <a:r>
-              <a:rPr lang="en-DK" dirty="0"/>
               <a:t>Center of Health Data Science</a:t>
             </a:r>
           </a:p>
@@ -3621,13 +3615,13 @@
           <a:p>
             <a:r>
               <a:rPr lang="en-DK" sz="2200" dirty="0"/>
-              <a:t>Start by a discussion of the project idea (~1h). Feel free to involve us during the planning!</a:t>
+              <a:t>Decide on a project and find the project responsible (Viki, Valentina or Iñigo) </a:t>
             </a:r>
           </a:p>
           <a:p>
             <a:r>
               <a:rPr lang="en-DK" sz="2200" dirty="0"/>
-              <a:t>Discuss with the instructors the project</a:t>
+              <a:t>Plan the project</a:t>
             </a:r>
           </a:p>
           <a:p>

</xml_diff>